<commit_message>
add the edited figure1 and clear unuse files
</commit_message>
<xml_diff>
--- a/5_Figure/Figure.pptx
+++ b/5_Figure/Figure.pptx
@@ -105,6 +105,11 @@
       </a:defRPr>
     </a:lvl9pPr>
   </p:defaultTextStyle>
+  <p:extLst>
+    <p:ext uri="{EFAFB233-063F-42B5-8137-9DF3F51BA10A}">
+      <p15:sldGuideLst xmlns:p15="http://schemas.microsoft.com/office/powerpoint/2012/main"/>
+    </p:ext>
+  </p:extLst>
 </p:presentation>
 </file>
 
@@ -239,7 +244,7 @@
           <a:p>
             <a:fld id="{6576E717-7BDE-D84B-B50F-875D4310BDA0}" type="datetimeFigureOut">
               <a:rPr kumimoji="1" lang="zh-CN" altLang="en-US" smtClean="0"/>
-              <a:t>2022/9/7</a:t>
+              <a:t>2022/12/25</a:t>
             </a:fld>
             <a:endParaRPr kumimoji="1" lang="zh-CN" altLang="en-US"/>
           </a:p>
@@ -409,7 +414,7 @@
           <a:p>
             <a:fld id="{6576E717-7BDE-D84B-B50F-875D4310BDA0}" type="datetimeFigureOut">
               <a:rPr kumimoji="1" lang="zh-CN" altLang="en-US" smtClean="0"/>
-              <a:t>2022/9/7</a:t>
+              <a:t>2022/12/25</a:t>
             </a:fld>
             <a:endParaRPr kumimoji="1" lang="zh-CN" altLang="en-US"/>
           </a:p>
@@ -589,7 +594,7 @@
           <a:p>
             <a:fld id="{6576E717-7BDE-D84B-B50F-875D4310BDA0}" type="datetimeFigureOut">
               <a:rPr kumimoji="1" lang="zh-CN" altLang="en-US" smtClean="0"/>
-              <a:t>2022/9/7</a:t>
+              <a:t>2022/12/25</a:t>
             </a:fld>
             <a:endParaRPr kumimoji="1" lang="zh-CN" altLang="en-US"/>
           </a:p>
@@ -759,7 +764,7 @@
           <a:p>
             <a:fld id="{6576E717-7BDE-D84B-B50F-875D4310BDA0}" type="datetimeFigureOut">
               <a:rPr kumimoji="1" lang="zh-CN" altLang="en-US" smtClean="0"/>
-              <a:t>2022/9/7</a:t>
+              <a:t>2022/12/25</a:t>
             </a:fld>
             <a:endParaRPr kumimoji="1" lang="zh-CN" altLang="en-US"/>
           </a:p>
@@ -1003,7 +1008,7 @@
           <a:p>
             <a:fld id="{6576E717-7BDE-D84B-B50F-875D4310BDA0}" type="datetimeFigureOut">
               <a:rPr kumimoji="1" lang="zh-CN" altLang="en-US" smtClean="0"/>
-              <a:t>2022/9/7</a:t>
+              <a:t>2022/12/25</a:t>
             </a:fld>
             <a:endParaRPr kumimoji="1" lang="zh-CN" altLang="en-US"/>
           </a:p>
@@ -1235,7 +1240,7 @@
           <a:p>
             <a:fld id="{6576E717-7BDE-D84B-B50F-875D4310BDA0}" type="datetimeFigureOut">
               <a:rPr kumimoji="1" lang="zh-CN" altLang="en-US" smtClean="0"/>
-              <a:t>2022/9/7</a:t>
+              <a:t>2022/12/25</a:t>
             </a:fld>
             <a:endParaRPr kumimoji="1" lang="zh-CN" altLang="en-US"/>
           </a:p>
@@ -1602,7 +1607,7 @@
           <a:p>
             <a:fld id="{6576E717-7BDE-D84B-B50F-875D4310BDA0}" type="datetimeFigureOut">
               <a:rPr kumimoji="1" lang="zh-CN" altLang="en-US" smtClean="0"/>
-              <a:t>2022/9/7</a:t>
+              <a:t>2022/12/25</a:t>
             </a:fld>
             <a:endParaRPr kumimoji="1" lang="zh-CN" altLang="en-US"/>
           </a:p>
@@ -1720,7 +1725,7 @@
           <a:p>
             <a:fld id="{6576E717-7BDE-D84B-B50F-875D4310BDA0}" type="datetimeFigureOut">
               <a:rPr kumimoji="1" lang="zh-CN" altLang="en-US" smtClean="0"/>
-              <a:t>2022/9/7</a:t>
+              <a:t>2022/12/25</a:t>
             </a:fld>
             <a:endParaRPr kumimoji="1" lang="zh-CN" altLang="en-US"/>
           </a:p>
@@ -1815,7 +1820,7 @@
           <a:p>
             <a:fld id="{6576E717-7BDE-D84B-B50F-875D4310BDA0}" type="datetimeFigureOut">
               <a:rPr kumimoji="1" lang="zh-CN" altLang="en-US" smtClean="0"/>
-              <a:t>2022/9/7</a:t>
+              <a:t>2022/12/25</a:t>
             </a:fld>
             <a:endParaRPr kumimoji="1" lang="zh-CN" altLang="en-US"/>
           </a:p>
@@ -2092,7 +2097,7 @@
           <a:p>
             <a:fld id="{6576E717-7BDE-D84B-B50F-875D4310BDA0}" type="datetimeFigureOut">
               <a:rPr kumimoji="1" lang="zh-CN" altLang="en-US" smtClean="0"/>
-              <a:t>2022/9/7</a:t>
+              <a:t>2022/12/25</a:t>
             </a:fld>
             <a:endParaRPr kumimoji="1" lang="zh-CN" altLang="en-US"/>
           </a:p>
@@ -2349,7 +2354,7 @@
           <a:p>
             <a:fld id="{6576E717-7BDE-D84B-B50F-875D4310BDA0}" type="datetimeFigureOut">
               <a:rPr kumimoji="1" lang="zh-CN" altLang="en-US" smtClean="0"/>
-              <a:t>2022/9/7</a:t>
+              <a:t>2022/12/25</a:t>
             </a:fld>
             <a:endParaRPr kumimoji="1" lang="zh-CN" altLang="en-US"/>
           </a:p>
@@ -2562,7 +2567,7 @@
           <a:p>
             <a:fld id="{6576E717-7BDE-D84B-B50F-875D4310BDA0}" type="datetimeFigureOut">
               <a:rPr kumimoji="1" lang="zh-CN" altLang="en-US" smtClean="0"/>
-              <a:t>2022/9/7</a:t>
+              <a:t>2022/12/25</a:t>
             </a:fld>
             <a:endParaRPr kumimoji="1" lang="zh-CN" altLang="en-US"/>
           </a:p>
@@ -3197,41 +3202,11 @@
         <p:grpSpPr>
           <a:xfrm>
             <a:off x="2816983" y="459410"/>
-            <a:ext cx="4565954" cy="5939180"/>
+            <a:ext cx="4555207" cy="5939180"/>
             <a:chOff x="4665033" y="334745"/>
-            <a:chExt cx="4565954" cy="5939180"/>
+            <a:chExt cx="4555207" cy="5939180"/>
           </a:xfrm>
         </p:grpSpPr>
-        <p:pic>
-          <p:nvPicPr>
-            <p:cNvPr id="3" name="图片 2">
-              <a:extLst>
-                <a:ext uri="{FF2B5EF4-FFF2-40B4-BE49-F238E27FC236}">
-                  <a16:creationId xmlns:a16="http://schemas.microsoft.com/office/drawing/2014/main" id="{22C9BFAD-C996-63AF-8292-577ADCF37657}"/>
-                </a:ext>
-              </a:extLst>
-            </p:cNvPr>
-            <p:cNvPicPr>
-              <a:picLocks noChangeAspect="1"/>
-            </p:cNvPicPr>
-            <p:nvPr/>
-          </p:nvPicPr>
-          <p:blipFill>
-            <a:blip r:embed="rId2"/>
-            <a:stretch>
-              <a:fillRect/>
-            </a:stretch>
-          </p:blipFill>
-          <p:spPr>
-            <a:xfrm>
-              <a:off x="4931508" y="584075"/>
-              <a:ext cx="4299479" cy="2689041"/>
-            </a:xfrm>
-            <a:prstGeom prst="rect">
-              <a:avLst/>
-            </a:prstGeom>
-          </p:spPr>
-        </p:pic>
         <p:pic>
           <p:nvPicPr>
             <p:cNvPr id="5" name="图片 4">
@@ -3247,7 +3222,7 @@
             <p:nvPr/>
           </p:nvPicPr>
           <p:blipFill>
-            <a:blip r:embed="rId3"/>
+            <a:blip r:embed="rId2"/>
             <a:stretch>
               <a:fillRect/>
             </a:stretch>
@@ -3347,6 +3322,36 @@
           </p:txBody>
         </p:sp>
       </p:grpSp>
+      <p:pic>
+        <p:nvPicPr>
+          <p:cNvPr id="4" name="图片 3" descr="图形用户界面, 文本, 应用程序, 电子邮件&#10;&#10;描述已自动生成">
+            <a:extLst>
+              <a:ext uri="{FF2B5EF4-FFF2-40B4-BE49-F238E27FC236}">
+                <a16:creationId xmlns:a16="http://schemas.microsoft.com/office/drawing/2014/main" id="{C070C0C6-9D02-BF46-76B3-02D9169A1A78}"/>
+              </a:ext>
+            </a:extLst>
+          </p:cNvPr>
+          <p:cNvPicPr>
+            <a:picLocks noChangeAspect="1"/>
+          </p:cNvPicPr>
+          <p:nvPr/>
+        </p:nvPicPr>
+        <p:blipFill>
+          <a:blip r:embed="rId3"/>
+          <a:stretch>
+            <a:fillRect/>
+          </a:stretch>
+        </p:blipFill>
+        <p:spPr>
+          <a:xfrm>
+            <a:off x="3195924" y="582520"/>
+            <a:ext cx="4295001" cy="2684376"/>
+          </a:xfrm>
+          <a:prstGeom prst="rect">
+            <a:avLst/>
+          </a:prstGeom>
+        </p:spPr>
+      </p:pic>
     </p:spTree>
     <p:extLst>
       <p:ext uri="{BB962C8B-B14F-4D97-AF65-F5344CB8AC3E}">

</xml_diff>

<commit_message>
add the correct Figure2
</commit_message>
<xml_diff>
--- a/5_Figure/Figure.pptx
+++ b/5_Figure/Figure.pptx
@@ -7,6 +7,7 @@
   <p:sldIdLst>
     <p:sldId id="256" r:id="rId2"/>
     <p:sldId id="257" r:id="rId3"/>
+    <p:sldId id="258" r:id="rId4"/>
   </p:sldIdLst>
   <p:sldSz cx="9906000" cy="6858000" type="A4"/>
   <p:notesSz cx="6858000" cy="9144000"/>
@@ -244,7 +245,7 @@
           <a:p>
             <a:fld id="{6576E717-7BDE-D84B-B50F-875D4310BDA0}" type="datetimeFigureOut">
               <a:rPr kumimoji="1" lang="zh-CN" altLang="en-US" smtClean="0"/>
-              <a:t>2022/12/25</a:t>
+              <a:t>2023/2/6</a:t>
             </a:fld>
             <a:endParaRPr kumimoji="1" lang="zh-CN" altLang="en-US"/>
           </a:p>
@@ -414,7 +415,7 @@
           <a:p>
             <a:fld id="{6576E717-7BDE-D84B-B50F-875D4310BDA0}" type="datetimeFigureOut">
               <a:rPr kumimoji="1" lang="zh-CN" altLang="en-US" smtClean="0"/>
-              <a:t>2022/12/25</a:t>
+              <a:t>2023/2/6</a:t>
             </a:fld>
             <a:endParaRPr kumimoji="1" lang="zh-CN" altLang="en-US"/>
           </a:p>
@@ -594,7 +595,7 @@
           <a:p>
             <a:fld id="{6576E717-7BDE-D84B-B50F-875D4310BDA0}" type="datetimeFigureOut">
               <a:rPr kumimoji="1" lang="zh-CN" altLang="en-US" smtClean="0"/>
-              <a:t>2022/12/25</a:t>
+              <a:t>2023/2/6</a:t>
             </a:fld>
             <a:endParaRPr kumimoji="1" lang="zh-CN" altLang="en-US"/>
           </a:p>
@@ -764,7 +765,7 @@
           <a:p>
             <a:fld id="{6576E717-7BDE-D84B-B50F-875D4310BDA0}" type="datetimeFigureOut">
               <a:rPr kumimoji="1" lang="zh-CN" altLang="en-US" smtClean="0"/>
-              <a:t>2022/12/25</a:t>
+              <a:t>2023/2/6</a:t>
             </a:fld>
             <a:endParaRPr kumimoji="1" lang="zh-CN" altLang="en-US"/>
           </a:p>
@@ -1008,7 +1009,7 @@
           <a:p>
             <a:fld id="{6576E717-7BDE-D84B-B50F-875D4310BDA0}" type="datetimeFigureOut">
               <a:rPr kumimoji="1" lang="zh-CN" altLang="en-US" smtClean="0"/>
-              <a:t>2022/12/25</a:t>
+              <a:t>2023/2/6</a:t>
             </a:fld>
             <a:endParaRPr kumimoji="1" lang="zh-CN" altLang="en-US"/>
           </a:p>
@@ -1240,7 +1241,7 @@
           <a:p>
             <a:fld id="{6576E717-7BDE-D84B-B50F-875D4310BDA0}" type="datetimeFigureOut">
               <a:rPr kumimoji="1" lang="zh-CN" altLang="en-US" smtClean="0"/>
-              <a:t>2022/12/25</a:t>
+              <a:t>2023/2/6</a:t>
             </a:fld>
             <a:endParaRPr kumimoji="1" lang="zh-CN" altLang="en-US"/>
           </a:p>
@@ -1607,7 +1608,7 @@
           <a:p>
             <a:fld id="{6576E717-7BDE-D84B-B50F-875D4310BDA0}" type="datetimeFigureOut">
               <a:rPr kumimoji="1" lang="zh-CN" altLang="en-US" smtClean="0"/>
-              <a:t>2022/12/25</a:t>
+              <a:t>2023/2/6</a:t>
             </a:fld>
             <a:endParaRPr kumimoji="1" lang="zh-CN" altLang="en-US"/>
           </a:p>
@@ -1725,7 +1726,7 @@
           <a:p>
             <a:fld id="{6576E717-7BDE-D84B-B50F-875D4310BDA0}" type="datetimeFigureOut">
               <a:rPr kumimoji="1" lang="zh-CN" altLang="en-US" smtClean="0"/>
-              <a:t>2022/12/25</a:t>
+              <a:t>2023/2/6</a:t>
             </a:fld>
             <a:endParaRPr kumimoji="1" lang="zh-CN" altLang="en-US"/>
           </a:p>
@@ -1820,7 +1821,7 @@
           <a:p>
             <a:fld id="{6576E717-7BDE-D84B-B50F-875D4310BDA0}" type="datetimeFigureOut">
               <a:rPr kumimoji="1" lang="zh-CN" altLang="en-US" smtClean="0"/>
-              <a:t>2022/12/25</a:t>
+              <a:t>2023/2/6</a:t>
             </a:fld>
             <a:endParaRPr kumimoji="1" lang="zh-CN" altLang="en-US"/>
           </a:p>
@@ -2097,7 +2098,7 @@
           <a:p>
             <a:fld id="{6576E717-7BDE-D84B-B50F-875D4310BDA0}" type="datetimeFigureOut">
               <a:rPr kumimoji="1" lang="zh-CN" altLang="en-US" smtClean="0"/>
-              <a:t>2022/12/25</a:t>
+              <a:t>2023/2/6</a:t>
             </a:fld>
             <a:endParaRPr kumimoji="1" lang="zh-CN" altLang="en-US"/>
           </a:p>
@@ -2354,7 +2355,7 @@
           <a:p>
             <a:fld id="{6576E717-7BDE-D84B-B50F-875D4310BDA0}" type="datetimeFigureOut">
               <a:rPr kumimoji="1" lang="zh-CN" altLang="en-US" smtClean="0"/>
-              <a:t>2022/12/25</a:t>
+              <a:t>2023/2/6</a:t>
             </a:fld>
             <a:endParaRPr kumimoji="1" lang="zh-CN" altLang="en-US"/>
           </a:p>
@@ -2567,7 +2568,7 @@
           <a:p>
             <a:fld id="{6576E717-7BDE-D84B-B50F-875D4310BDA0}" type="datetimeFigureOut">
               <a:rPr kumimoji="1" lang="zh-CN" altLang="en-US" smtClean="0"/>
-              <a:t>2022/12/25</a:t>
+              <a:t>2023/2/6</a:t>
             </a:fld>
             <a:endParaRPr kumimoji="1" lang="zh-CN" altLang="en-US"/>
           </a:p>
@@ -3365,6 +3366,207 @@
 </p:sld>
 </file>
 
+<file path=ppt/slides/slide3.xml><?xml version="1.0" encoding="utf-8"?>
+<p:sld xmlns:a="http://schemas.openxmlformats.org/drawingml/2006/main" xmlns:r="http://schemas.openxmlformats.org/officeDocument/2006/relationships" xmlns:p="http://schemas.openxmlformats.org/presentationml/2006/main">
+  <p:cSld>
+    <p:spTree>
+      <p:nvGrpSpPr>
+        <p:cNvPr id="1" name=""/>
+        <p:cNvGrpSpPr/>
+        <p:nvPr/>
+      </p:nvGrpSpPr>
+      <p:grpSpPr>
+        <a:xfrm>
+          <a:off x="0" y="0"/>
+          <a:ext cx="0" cy="0"/>
+          <a:chOff x="0" y="0"/>
+          <a:chExt cx="0" cy="0"/>
+        </a:xfrm>
+      </p:grpSpPr>
+      <p:grpSp>
+        <p:nvGrpSpPr>
+          <p:cNvPr id="18" name="组合 17">
+            <a:extLst>
+              <a:ext uri="{FF2B5EF4-FFF2-40B4-BE49-F238E27FC236}">
+                <a16:creationId xmlns:a16="http://schemas.microsoft.com/office/drawing/2014/main" id="{6229F4CA-CDF2-3D67-AA01-5F49916FF4AF}"/>
+              </a:ext>
+            </a:extLst>
+          </p:cNvPr>
+          <p:cNvGrpSpPr/>
+          <p:nvPr/>
+        </p:nvGrpSpPr>
+        <p:grpSpPr>
+          <a:xfrm>
+            <a:off x="2426562" y="473644"/>
+            <a:ext cx="4549348" cy="3236392"/>
+            <a:chOff x="403652" y="654680"/>
+            <a:chExt cx="4549348" cy="3236392"/>
+          </a:xfrm>
+        </p:grpSpPr>
+        <p:pic>
+          <p:nvPicPr>
+            <p:cNvPr id="15" name="图片 14" descr="图形用户界面, 图表&#10;&#10;中度可信度描述已自动生成">
+              <a:extLst>
+                <a:ext uri="{FF2B5EF4-FFF2-40B4-BE49-F238E27FC236}">
+                  <a16:creationId xmlns:a16="http://schemas.microsoft.com/office/drawing/2014/main" id="{FCB3D0E5-7146-3CD8-E4B6-31476C04C4C6}"/>
+                </a:ext>
+              </a:extLst>
+            </p:cNvPr>
+            <p:cNvPicPr>
+              <a:picLocks noChangeAspect="1"/>
+            </p:cNvPicPr>
+            <p:nvPr/>
+          </p:nvPicPr>
+          <p:blipFill>
+            <a:blip r:embed="rId2">
+              <a:extLst>
+                <a:ext uri="{28A0092B-C50C-407E-A947-70E740481C1C}">
+                  <a14:useLocalDpi xmlns:a14="http://schemas.microsoft.com/office/drawing/2010/main" val="0"/>
+                </a:ext>
+              </a:extLst>
+            </a:blip>
+            <a:stretch>
+              <a:fillRect/>
+            </a:stretch>
+          </p:blipFill>
+          <p:spPr>
+            <a:xfrm>
+              <a:off x="653520" y="900901"/>
+              <a:ext cx="4299480" cy="2687175"/>
+            </a:xfrm>
+            <a:prstGeom prst="rect">
+              <a:avLst/>
+            </a:prstGeom>
+          </p:spPr>
+        </p:pic>
+        <p:sp>
+          <p:nvSpPr>
+            <p:cNvPr id="16" name="文本框 15">
+              <a:extLst>
+                <a:ext uri="{FF2B5EF4-FFF2-40B4-BE49-F238E27FC236}">
+                  <a16:creationId xmlns:a16="http://schemas.microsoft.com/office/drawing/2014/main" id="{53CCB83A-1076-159F-42E2-FABAD798A0C8}"/>
+                </a:ext>
+              </a:extLst>
+            </p:cNvPr>
+            <p:cNvSpPr txBox="1"/>
+            <p:nvPr/>
+          </p:nvSpPr>
+          <p:spPr>
+            <a:xfrm>
+              <a:off x="403653" y="654680"/>
+              <a:ext cx="378941" cy="246221"/>
+            </a:xfrm>
+            <a:prstGeom prst="rect">
+              <a:avLst/>
+            </a:prstGeom>
+            <a:noFill/>
+          </p:spPr>
+          <p:txBody>
+            <a:bodyPr wrap="square" rtlCol="0">
+              <a:spAutoFit/>
+            </a:bodyPr>
+            <a:lstStyle/>
+            <a:p>
+              <a:r>
+                <a:rPr kumimoji="1" lang="en-US" altLang="zh-CN" sz="1000" dirty="0">
+                  <a:latin typeface="Times New Roman" panose="02020603050405020304" pitchFamily="18" charset="0"/>
+                  <a:cs typeface="Times New Roman" panose="02020603050405020304" pitchFamily="18" charset="0"/>
+                </a:rPr>
+                <a:t>A.</a:t>
+              </a:r>
+              <a:endParaRPr kumimoji="1" lang="zh-CN" altLang="en-US" sz="1000" dirty="0">
+                <a:latin typeface="Times New Roman" panose="02020603050405020304" pitchFamily="18" charset="0"/>
+                <a:cs typeface="Times New Roman" panose="02020603050405020304" pitchFamily="18" charset="0"/>
+              </a:endParaRPr>
+            </a:p>
+          </p:txBody>
+        </p:sp>
+        <p:sp>
+          <p:nvSpPr>
+            <p:cNvPr id="17" name="文本框 16">
+              <a:extLst>
+                <a:ext uri="{FF2B5EF4-FFF2-40B4-BE49-F238E27FC236}">
+                  <a16:creationId xmlns:a16="http://schemas.microsoft.com/office/drawing/2014/main" id="{3B16537A-EE68-F2FA-46D6-E0D8E1CBD042}"/>
+                </a:ext>
+              </a:extLst>
+            </p:cNvPr>
+            <p:cNvSpPr txBox="1"/>
+            <p:nvPr/>
+          </p:nvSpPr>
+          <p:spPr>
+            <a:xfrm>
+              <a:off x="403652" y="3644851"/>
+              <a:ext cx="378941" cy="246221"/>
+            </a:xfrm>
+            <a:prstGeom prst="rect">
+              <a:avLst/>
+            </a:prstGeom>
+            <a:noFill/>
+          </p:spPr>
+          <p:txBody>
+            <a:bodyPr wrap="square" rtlCol="0">
+              <a:spAutoFit/>
+            </a:bodyPr>
+            <a:lstStyle/>
+            <a:p>
+              <a:r>
+                <a:rPr kumimoji="1" lang="en-US" altLang="zh-CN" sz="1000" dirty="0">
+                  <a:latin typeface="Times New Roman" panose="02020603050405020304" pitchFamily="18" charset="0"/>
+                  <a:cs typeface="Times New Roman" panose="02020603050405020304" pitchFamily="18" charset="0"/>
+                </a:rPr>
+                <a:t>B.</a:t>
+              </a:r>
+              <a:endParaRPr kumimoji="1" lang="zh-CN" altLang="en-US" sz="1000" dirty="0">
+                <a:latin typeface="Times New Roman" panose="02020603050405020304" pitchFamily="18" charset="0"/>
+                <a:cs typeface="Times New Roman" panose="02020603050405020304" pitchFamily="18" charset="0"/>
+              </a:endParaRPr>
+            </a:p>
+          </p:txBody>
+        </p:sp>
+      </p:grpSp>
+      <p:pic>
+        <p:nvPicPr>
+          <p:cNvPr id="3" name="图片 2" descr="图形用户界面, 应用程序&#10;&#10;描述已自动生成">
+            <a:extLst>
+              <a:ext uri="{FF2B5EF4-FFF2-40B4-BE49-F238E27FC236}">
+                <a16:creationId xmlns:a16="http://schemas.microsoft.com/office/drawing/2014/main" id="{FBDAF6AA-A15F-ABEB-28D7-47902913E103}"/>
+              </a:ext>
+            </a:extLst>
+          </p:cNvPr>
+          <p:cNvPicPr>
+            <a:picLocks noChangeAspect="1"/>
+          </p:cNvPicPr>
+          <p:nvPr/>
+        </p:nvPicPr>
+        <p:blipFill>
+          <a:blip r:embed="rId3"/>
+          <a:stretch>
+            <a:fillRect/>
+          </a:stretch>
+        </p:blipFill>
+        <p:spPr>
+          <a:xfrm>
+            <a:off x="2676430" y="3653261"/>
+            <a:ext cx="4299480" cy="2687175"/>
+          </a:xfrm>
+          <a:prstGeom prst="rect">
+            <a:avLst/>
+          </a:prstGeom>
+        </p:spPr>
+      </p:pic>
+    </p:spTree>
+    <p:extLst>
+      <p:ext uri="{BB962C8B-B14F-4D97-AF65-F5344CB8AC3E}">
+        <p14:creationId xmlns:p14="http://schemas.microsoft.com/office/powerpoint/2010/main" val="3713938193"/>
+      </p:ext>
+    </p:extLst>
+  </p:cSld>
+  <p:clrMapOvr>
+    <a:masterClrMapping/>
+  </p:clrMapOvr>
+</p:sld>
+</file>
+
 <file path=ppt/theme/theme1.xml><?xml version="1.0" encoding="utf-8"?>
 <a:theme xmlns:a="http://schemas.openxmlformats.org/drawingml/2006/main" name="Office 主题​​">
   <a:themeElements>

</xml_diff>